<commit_message>
Modelo de clases v2
</commit_message>
<xml_diff>
--- a/Modelo-Veterinaria.pptx
+++ b/Modelo-Veterinaria.pptx
@@ -1920,7 +1920,7 @@
             <a:fld id="{D7B49C76-06B7-43A9-AAE0-EB5BAF02C024}" type="datetimeFigureOut">
               <a:rPr lang="es-ES" smtClean="0"/>
               <a:pPr/>
-              <a:t>28/07/2012</a:t>
+              <a:t>31/07/2012</a:t>
             </a:fld>
             <a:endParaRPr lang="es-ES"/>
           </a:p>
@@ -1963,7 +1963,7 @@
             <a:fld id="{8B2833FA-DA3A-4C0E-8C80-9D3073016557}" type="slidenum">
               <a:rPr lang="es-ES" smtClean="0"/>
               <a:pPr/>
-              <a:t>‹Nº›</a:t>
+              <a:t>‹#›</a:t>
             </a:fld>
             <a:endParaRPr lang="es-ES"/>
           </a:p>
@@ -2103,7 +2103,7 @@
             <a:fld id="{D7B49C76-06B7-43A9-AAE0-EB5BAF02C024}" type="datetimeFigureOut">
               <a:rPr lang="es-ES" smtClean="0"/>
               <a:pPr/>
-              <a:t>28/07/2012</a:t>
+              <a:t>31/07/2012</a:t>
             </a:fld>
             <a:endParaRPr lang="es-ES"/>
           </a:p>
@@ -2146,7 +2146,7 @@
             <a:fld id="{8B2833FA-DA3A-4C0E-8C80-9D3073016557}" type="slidenum">
               <a:rPr lang="es-ES" smtClean="0"/>
               <a:pPr/>
-              <a:t>‹Nº›</a:t>
+              <a:t>‹#›</a:t>
             </a:fld>
             <a:endParaRPr lang="es-ES"/>
           </a:p>
@@ -2256,7 +2256,7 @@
             <a:fld id="{D7B49C76-06B7-43A9-AAE0-EB5BAF02C024}" type="datetimeFigureOut">
               <a:rPr lang="es-ES" smtClean="0"/>
               <a:pPr/>
-              <a:t>28/07/2012</a:t>
+              <a:t>31/07/2012</a:t>
             </a:fld>
             <a:endParaRPr lang="es-ES"/>
           </a:p>
@@ -2299,7 +2299,7 @@
             <a:fld id="{8B2833FA-DA3A-4C0E-8C80-9D3073016557}" type="slidenum">
               <a:rPr lang="es-ES" smtClean="0"/>
               <a:pPr/>
-              <a:t>‹Nº›</a:t>
+              <a:t>‹#›</a:t>
             </a:fld>
             <a:endParaRPr lang="es-ES"/>
           </a:p>
@@ -4084,7 +4084,7 @@
             <a:fld id="{D7B49C76-06B7-43A9-AAE0-EB5BAF02C024}" type="datetimeFigureOut">
               <a:rPr lang="es-ES" smtClean="0"/>
               <a:pPr/>
-              <a:t>28/07/2012</a:t>
+              <a:t>31/07/2012</a:t>
             </a:fld>
             <a:endParaRPr lang="es-ES"/>
           </a:p>
@@ -4127,7 +4127,7 @@
             <a:fld id="{8B2833FA-DA3A-4C0E-8C80-9D3073016557}" type="slidenum">
               <a:rPr lang="es-ES" smtClean="0"/>
               <a:pPr/>
-              <a:t>‹Nº›</a:t>
+              <a:t>‹#›</a:t>
             </a:fld>
             <a:endParaRPr lang="es-ES"/>
           </a:p>
@@ -5956,7 +5956,7 @@
             <a:fld id="{D7B49C76-06B7-43A9-AAE0-EB5BAF02C024}" type="datetimeFigureOut">
               <a:rPr lang="es-ES" smtClean="0"/>
               <a:pPr/>
-              <a:t>28/07/2012</a:t>
+              <a:t>31/07/2012</a:t>
             </a:fld>
             <a:endParaRPr lang="es-ES"/>
           </a:p>
@@ -5999,7 +5999,7 @@
             <a:fld id="{8B2833FA-DA3A-4C0E-8C80-9D3073016557}" type="slidenum">
               <a:rPr lang="es-ES" smtClean="0"/>
               <a:pPr/>
-              <a:t>‹Nº›</a:t>
+              <a:t>‹#›</a:t>
             </a:fld>
             <a:endParaRPr lang="es-ES"/>
           </a:p>
@@ -6071,7 +6071,7 @@
             <a:fld id="{D7B49C76-06B7-43A9-AAE0-EB5BAF02C024}" type="datetimeFigureOut">
               <a:rPr lang="es-ES" smtClean="0"/>
               <a:pPr/>
-              <a:t>28/07/2012</a:t>
+              <a:t>31/07/2012</a:t>
             </a:fld>
             <a:endParaRPr lang="es-ES"/>
           </a:p>
@@ -6114,7 +6114,7 @@
             <a:fld id="{8B2833FA-DA3A-4C0E-8C80-9D3073016557}" type="slidenum">
               <a:rPr lang="es-ES" smtClean="0"/>
               <a:pPr/>
-              <a:t>‹Nº›</a:t>
+              <a:t>‹#›</a:t>
             </a:fld>
             <a:endParaRPr lang="es-ES"/>
           </a:p>
@@ -6614,7 +6614,7 @@
             <a:fld id="{D7B49C76-06B7-43A9-AAE0-EB5BAF02C024}" type="datetimeFigureOut">
               <a:rPr lang="es-ES" smtClean="0"/>
               <a:pPr/>
-              <a:t>28/07/2012</a:t>
+              <a:t>31/07/2012</a:t>
             </a:fld>
             <a:endParaRPr lang="es-ES"/>
           </a:p>
@@ -6657,7 +6657,7 @@
             <a:fld id="{8B2833FA-DA3A-4C0E-8C80-9D3073016557}" type="slidenum">
               <a:rPr lang="es-ES" smtClean="0"/>
               <a:pPr/>
-              <a:t>‹Nº›</a:t>
+              <a:t>‹#›</a:t>
             </a:fld>
             <a:endParaRPr lang="es-ES"/>
           </a:p>
@@ -6729,7 +6729,7 @@
             <a:fld id="{D7B49C76-06B7-43A9-AAE0-EB5BAF02C024}" type="datetimeFigureOut">
               <a:rPr lang="es-ES" smtClean="0"/>
               <a:pPr/>
-              <a:t>28/07/2012</a:t>
+              <a:t>31/07/2012</a:t>
             </a:fld>
             <a:endParaRPr lang="es-ES"/>
           </a:p>
@@ -6772,7 +6772,7 @@
             <a:fld id="{8B2833FA-DA3A-4C0E-8C80-9D3073016557}" type="slidenum">
               <a:rPr lang="es-ES" smtClean="0"/>
               <a:pPr/>
-              <a:t>‹Nº›</a:t>
+              <a:t>‹#›</a:t>
             </a:fld>
             <a:endParaRPr lang="es-ES"/>
           </a:p>
@@ -8442,7 +8442,7 @@
             <a:fld id="{D7B49C76-06B7-43A9-AAE0-EB5BAF02C024}" type="datetimeFigureOut">
               <a:rPr lang="es-ES" smtClean="0"/>
               <a:pPr/>
-              <a:t>28/07/2012</a:t>
+              <a:t>31/07/2012</a:t>
             </a:fld>
             <a:endParaRPr lang="es-ES"/>
           </a:p>
@@ -8485,7 +8485,7 @@
             <a:fld id="{8B2833FA-DA3A-4C0E-8C80-9D3073016557}" type="slidenum">
               <a:rPr lang="es-ES" smtClean="0"/>
               <a:pPr/>
-              <a:t>‹Nº›</a:t>
+              <a:t>‹#›</a:t>
             </a:fld>
             <a:endParaRPr lang="es-ES"/>
           </a:p>
@@ -8595,7 +8595,7 @@
             <a:fld id="{D7B49C76-06B7-43A9-AAE0-EB5BAF02C024}" type="datetimeFigureOut">
               <a:rPr lang="es-ES" smtClean="0"/>
               <a:pPr/>
-              <a:t>28/07/2012</a:t>
+              <a:t>31/07/2012</a:t>
             </a:fld>
             <a:endParaRPr lang="es-ES"/>
           </a:p>
@@ -8638,7 +8638,7 @@
             <a:fld id="{8B2833FA-DA3A-4C0E-8C80-9D3073016557}" type="slidenum">
               <a:rPr lang="es-ES" smtClean="0"/>
               <a:pPr/>
-              <a:t>‹Nº›</a:t>
+              <a:t>‹#›</a:t>
             </a:fld>
             <a:endParaRPr lang="es-ES"/>
           </a:p>
@@ -12212,7 +12212,7 @@
             <a:fld id="{D7B49C76-06B7-43A9-AAE0-EB5BAF02C024}" type="datetimeFigureOut">
               <a:rPr lang="es-ES" smtClean="0"/>
               <a:pPr/>
-              <a:t>28/07/2012</a:t>
+              <a:t>31/07/2012</a:t>
             </a:fld>
             <a:endParaRPr lang="es-ES"/>
           </a:p>
@@ -12255,7 +12255,7 @@
             <a:fld id="{8B2833FA-DA3A-4C0E-8C80-9D3073016557}" type="slidenum">
               <a:rPr lang="es-ES" smtClean="0"/>
               <a:pPr/>
-              <a:t>‹Nº›</a:t>
+              <a:t>‹#›</a:t>
             </a:fld>
             <a:endParaRPr lang="es-ES"/>
           </a:p>
@@ -14073,7 +14073,7 @@
             <a:fld id="{D7B49C76-06B7-43A9-AAE0-EB5BAF02C024}" type="datetimeFigureOut">
               <a:rPr lang="es-ES" smtClean="0"/>
               <a:pPr/>
-              <a:t>28/07/2012</a:t>
+              <a:t>31/07/2012</a:t>
             </a:fld>
             <a:endParaRPr lang="es-ES"/>
           </a:p>
@@ -14148,7 +14148,7 @@
             <a:fld id="{8B2833FA-DA3A-4C0E-8C80-9D3073016557}" type="slidenum">
               <a:rPr lang="es-ES" smtClean="0"/>
               <a:pPr/>
-              <a:t>‹Nº›</a:t>
+              <a:t>‹#›</a:t>
             </a:fld>
             <a:endParaRPr lang="es-ES"/>
           </a:p>
@@ -14598,7 +14598,7 @@
         </p:nvSpPr>
         <p:spPr>
           <a:xfrm>
-            <a:off x="4139952" y="5877272"/>
+            <a:off x="3347864" y="5733256"/>
             <a:ext cx="1656184" cy="356616"/>
           </a:xfrm>
           <a:prstGeom prst="roundRect">
@@ -14669,7 +14669,7 @@
         </p:nvSpPr>
         <p:spPr>
           <a:xfrm>
-            <a:off x="6372200" y="5877272"/>
+            <a:off x="5580112" y="5733256"/>
             <a:ext cx="1440160" cy="360040"/>
           </a:xfrm>
           <a:prstGeom prst="roundRect">
@@ -14740,7 +14740,7 @@
         </p:nvSpPr>
         <p:spPr>
           <a:xfrm>
-            <a:off x="5868144" y="3429000"/>
+            <a:off x="5076056" y="3284984"/>
             <a:ext cx="1296144" cy="356616"/>
           </a:xfrm>
           <a:prstGeom prst="roundRect">
@@ -14795,7 +14795,7 @@
         </p:nvSpPr>
         <p:spPr>
           <a:xfrm>
-            <a:off x="1115616" y="5301208"/>
+            <a:off x="323528" y="5157192"/>
             <a:ext cx="1224136" cy="356616"/>
           </a:xfrm>
           <a:prstGeom prst="roundRect">
@@ -14850,7 +14850,7 @@
         </p:nvSpPr>
         <p:spPr>
           <a:xfrm>
-            <a:off x="4427984" y="4221088"/>
+            <a:off x="3635896" y="4077072"/>
             <a:ext cx="1152128" cy="360040"/>
           </a:xfrm>
           <a:prstGeom prst="roundRect">
@@ -14905,7 +14905,7 @@
         </p:nvSpPr>
         <p:spPr>
           <a:xfrm>
-            <a:off x="5868144" y="2276872"/>
+            <a:off x="5076056" y="2132856"/>
             <a:ext cx="1296144" cy="356616"/>
           </a:xfrm>
           <a:prstGeom prst="roundRect">
@@ -14963,7 +14963,7 @@
         </p:nvCxnSpPr>
         <p:spPr>
           <a:xfrm rot="5400000">
-            <a:off x="3222706" y="3698174"/>
+            <a:off x="2430618" y="3554158"/>
             <a:ext cx="898388" cy="2664296"/>
           </a:xfrm>
           <a:prstGeom prst="bentConnector2">
@@ -14999,7 +14999,7 @@
         </p:nvCxnSpPr>
         <p:spPr>
           <a:xfrm>
-            <a:off x="5148064" y="4581128"/>
+            <a:off x="4355976" y="4437112"/>
             <a:ext cx="0" cy="1296144"/>
           </a:xfrm>
           <a:prstGeom prst="straightConnector1">
@@ -15145,7 +15145,7 @@
         </p:nvSpPr>
         <p:spPr>
           <a:xfrm>
-            <a:off x="3131840" y="3429000"/>
+            <a:off x="2339752" y="3284984"/>
             <a:ext cx="1296144" cy="356616"/>
           </a:xfrm>
           <a:prstGeom prst="roundRect">
@@ -15202,7 +15202,7 @@
         </p:nvCxnSpPr>
         <p:spPr>
           <a:xfrm>
-            <a:off x="5652120" y="2959236"/>
+            <a:off x="4860032" y="2815220"/>
             <a:ext cx="1656184" cy="2918036"/>
           </a:xfrm>
           <a:prstGeom prst="bentConnector2">
@@ -15238,7 +15238,7 @@
         </p:nvSpPr>
         <p:spPr>
           <a:xfrm>
-            <a:off x="2987824" y="2276872"/>
+            <a:off x="2195736" y="2132856"/>
             <a:ext cx="1008112" cy="360040"/>
           </a:xfrm>
           <a:prstGeom prst="roundRect">
@@ -15291,7 +15291,7 @@
         </p:nvCxnSpPr>
         <p:spPr>
           <a:xfrm rot="10800000" flipV="1">
-            <a:off x="1727684" y="2456892"/>
+            <a:off x="935596" y="2312876"/>
             <a:ext cx="1260140" cy="2844316"/>
           </a:xfrm>
           <a:prstGeom prst="bentConnector2">
@@ -15327,7 +15327,7 @@
         </p:nvSpPr>
         <p:spPr>
           <a:xfrm>
-            <a:off x="4427984" y="1628800"/>
+            <a:off x="3635896" y="1484784"/>
             <a:ext cx="1152128" cy="356616"/>
           </a:xfrm>
           <a:prstGeom prst="roundRect">
@@ -15385,7 +15385,7 @@
         </p:nvCxnSpPr>
         <p:spPr>
           <a:xfrm rot="10800000" flipV="1">
-            <a:off x="3491880" y="1807108"/>
+            <a:off x="2699792" y="1663092"/>
             <a:ext cx="936104" cy="469764"/>
           </a:xfrm>
           <a:prstGeom prst="bentConnector2">
@@ -15424,7 +15424,7 @@
         </p:nvCxnSpPr>
         <p:spPr>
           <a:xfrm>
-            <a:off x="5580112" y="1807108"/>
+            <a:off x="4788024" y="1663092"/>
             <a:ext cx="936104" cy="469764"/>
           </a:xfrm>
           <a:prstGeom prst="bentConnector2">
@@ -15460,7 +15460,7 @@
         </p:nvSpPr>
         <p:spPr>
           <a:xfrm>
-            <a:off x="4355976" y="2780928"/>
+            <a:off x="3563888" y="2636912"/>
             <a:ext cx="1296144" cy="356616"/>
           </a:xfrm>
           <a:prstGeom prst="roundRect">
@@ -15518,7 +15518,7 @@
         </p:nvCxnSpPr>
         <p:spPr>
           <a:xfrm rot="10800000" flipV="1">
-            <a:off x="3779912" y="2959236"/>
+            <a:off x="2987824" y="2815220"/>
             <a:ext cx="576064" cy="469764"/>
           </a:xfrm>
           <a:prstGeom prst="bentConnector2">
@@ -15557,7 +15557,7 @@
         </p:nvCxnSpPr>
         <p:spPr>
           <a:xfrm>
-            <a:off x="5652120" y="2959236"/>
+            <a:off x="4860032" y="2815220"/>
             <a:ext cx="864096" cy="469764"/>
           </a:xfrm>
           <a:prstGeom prst="bentConnector2">
@@ -15596,7 +15596,7 @@
         </p:nvCxnSpPr>
         <p:spPr>
           <a:xfrm>
-            <a:off x="5004048" y="3137544"/>
+            <a:off x="4211960" y="2993528"/>
             <a:ext cx="0" cy="1083544"/>
           </a:xfrm>
           <a:prstGeom prst="straightConnector1">
@@ -15624,10 +15624,241 @@
           </a:fontRef>
         </p:style>
       </p:cxnSp>
+      <p:sp>
+        <p:nvSpPr>
+          <p:cNvPr id="22" name="248 Rectángulo redondeado"/>
+          <p:cNvSpPr/>
+          <p:nvPr/>
+        </p:nvSpPr>
+        <p:spPr>
+          <a:xfrm>
+            <a:off x="7297588" y="2636912"/>
+            <a:ext cx="1296144" cy="356616"/>
+          </a:xfrm>
+          <a:prstGeom prst="roundRect">
+            <a:avLst/>
+          </a:prstGeom>
+          <a:solidFill>
+            <a:schemeClr val="bg2"/>
+          </a:solidFill>
+        </p:spPr>
+        <p:style>
+          <a:lnRef idx="2">
+            <a:schemeClr val="accent1">
+              <a:shade val="50000"/>
+            </a:schemeClr>
+          </a:lnRef>
+          <a:fillRef idx="1">
+            <a:schemeClr val="accent1"/>
+          </a:fillRef>
+          <a:effectRef idx="0">
+            <a:schemeClr val="accent1"/>
+          </a:effectRef>
+          <a:fontRef idx="minor">
+            <a:schemeClr val="lt1"/>
+          </a:fontRef>
+        </p:style>
+        <p:txBody>
+          <a:bodyPr rtlCol="0" anchor="ctr"/>
+          <a:lstStyle/>
+          <a:p>
+            <a:pPr algn="ctr"/>
+            <a:r>
+              <a:rPr lang="en-US" sz="1400" dirty="0" err="1" smtClean="0">
+                <a:solidFill>
+                  <a:schemeClr val="tx2"/>
+                </a:solidFill>
+              </a:rPr>
+              <a:t>Factura</a:t>
+            </a:r>
+            <a:endParaRPr lang="en-US" sz="1400" dirty="0" smtClean="0">
+              <a:solidFill>
+                <a:schemeClr val="tx2"/>
+              </a:solidFill>
+            </a:endParaRPr>
+          </a:p>
+        </p:txBody>
+      </p:sp>
+      <p:sp>
+        <p:nvSpPr>
+          <p:cNvPr id="25" name="248 Rectángulo redondeado"/>
+          <p:cNvSpPr/>
+          <p:nvPr/>
+        </p:nvSpPr>
+        <p:spPr>
+          <a:xfrm>
+            <a:off x="7297588" y="4078784"/>
+            <a:ext cx="1296144" cy="356616"/>
+          </a:xfrm>
+          <a:prstGeom prst="roundRect">
+            <a:avLst/>
+          </a:prstGeom>
+          <a:solidFill>
+            <a:schemeClr val="bg2"/>
+          </a:solidFill>
+        </p:spPr>
+        <p:style>
+          <a:lnRef idx="2">
+            <a:schemeClr val="accent1">
+              <a:shade val="50000"/>
+            </a:schemeClr>
+          </a:lnRef>
+          <a:fillRef idx="1">
+            <a:schemeClr val="accent1"/>
+          </a:fillRef>
+          <a:effectRef idx="0">
+            <a:schemeClr val="accent1"/>
+          </a:effectRef>
+          <a:fontRef idx="minor">
+            <a:schemeClr val="lt1"/>
+          </a:fontRef>
+        </p:style>
+        <p:txBody>
+          <a:bodyPr rtlCol="0" anchor="ctr"/>
+          <a:lstStyle/>
+          <a:p>
+            <a:pPr algn="ctr"/>
+            <a:r>
+              <a:rPr lang="en-US" sz="1400" dirty="0" err="1" smtClean="0">
+                <a:solidFill>
+                  <a:schemeClr val="tx2"/>
+                </a:solidFill>
+              </a:rPr>
+              <a:t>Producto</a:t>
+            </a:r>
+            <a:endParaRPr lang="en-US" sz="1400" dirty="0" smtClean="0">
+              <a:solidFill>
+                <a:schemeClr val="tx2"/>
+              </a:solidFill>
+            </a:endParaRPr>
+          </a:p>
+        </p:txBody>
+      </p:sp>
+      <p:cxnSp>
+        <p:nvCxnSpPr>
+          <p:cNvPr id="5" name="Straight Arrow Connector 4"/>
+          <p:cNvCxnSpPr>
+            <a:stCxn id="22" idx="2"/>
+            <a:endCxn id="25" idx="0"/>
+          </p:cNvCxnSpPr>
+          <p:nvPr/>
+        </p:nvCxnSpPr>
+        <p:spPr>
+          <a:xfrm>
+            <a:off x="7945660" y="2993528"/>
+            <a:ext cx="0" cy="1085256"/>
+          </a:xfrm>
+          <a:prstGeom prst="straightConnector1">
+            <a:avLst/>
+          </a:prstGeom>
+          <a:ln>
+            <a:solidFill>
+              <a:schemeClr val="tx2"/>
+            </a:solidFill>
+            <a:tailEnd type="arrow"/>
+          </a:ln>
+        </p:spPr>
+        <p:style>
+          <a:lnRef idx="1">
+            <a:schemeClr val="accent1"/>
+          </a:lnRef>
+          <a:fillRef idx="0">
+            <a:schemeClr val="accent1"/>
+          </a:fillRef>
+          <a:effectRef idx="0">
+            <a:schemeClr val="accent1"/>
+          </a:effectRef>
+          <a:fontRef idx="minor">
+            <a:schemeClr val="tx1"/>
+          </a:fontRef>
+        </p:style>
+      </p:cxnSp>
+      <p:cxnSp>
+        <p:nvCxnSpPr>
+          <p:cNvPr id="15" name="Elbow Connector 14"/>
+          <p:cNvCxnSpPr>
+            <a:stCxn id="22" idx="1"/>
+            <a:endCxn id="18" idx="3"/>
+          </p:cNvCxnSpPr>
+          <p:nvPr/>
+        </p:nvCxnSpPr>
+        <p:spPr>
+          <a:xfrm rot="10800000" flipV="1">
+            <a:off x="4788024" y="2815220"/>
+            <a:ext cx="2509564" cy="1441872"/>
+          </a:xfrm>
+          <a:prstGeom prst="bentConnector3">
+            <a:avLst>
+              <a:gd name="adj1" fmla="val 18498"/>
+            </a:avLst>
+          </a:prstGeom>
+          <a:ln>
+            <a:solidFill>
+              <a:schemeClr val="tx2"/>
+            </a:solidFill>
+            <a:tailEnd type="arrow"/>
+          </a:ln>
+        </p:spPr>
+        <p:style>
+          <a:lnRef idx="1">
+            <a:schemeClr val="accent1"/>
+          </a:lnRef>
+          <a:fillRef idx="0">
+            <a:schemeClr val="accent1"/>
+          </a:fillRef>
+          <a:effectRef idx="0">
+            <a:schemeClr val="accent1"/>
+          </a:effectRef>
+          <a:fontRef idx="minor">
+            <a:schemeClr val="tx1"/>
+          </a:fontRef>
+        </p:style>
+      </p:cxnSp>
+      <p:cxnSp>
+        <p:nvCxnSpPr>
+          <p:cNvPr id="30" name="Elbow Connector 29"/>
+          <p:cNvCxnSpPr>
+            <a:stCxn id="22" idx="0"/>
+            <a:endCxn id="249" idx="0"/>
+          </p:cNvCxnSpPr>
+          <p:nvPr/>
+        </p:nvCxnSpPr>
+        <p:spPr>
+          <a:xfrm rot="16200000" flipV="1">
+            <a:off x="6078810" y="770062"/>
+            <a:ext cx="12700" cy="3733700"/>
+          </a:xfrm>
+          <a:prstGeom prst="bentConnector3">
+            <a:avLst>
+              <a:gd name="adj1" fmla="val 5475000"/>
+            </a:avLst>
+          </a:prstGeom>
+          <a:ln>
+            <a:solidFill>
+              <a:schemeClr val="tx2"/>
+            </a:solidFill>
+            <a:tailEnd type="arrow"/>
+          </a:ln>
+        </p:spPr>
+        <p:style>
+          <a:lnRef idx="1">
+            <a:schemeClr val="accent1"/>
+          </a:lnRef>
+          <a:fillRef idx="0">
+            <a:schemeClr val="accent1"/>
+          </a:fillRef>
+          <a:effectRef idx="0">
+            <a:schemeClr val="accent1"/>
+          </a:effectRef>
+          <a:fontRef idx="minor">
+            <a:schemeClr val="tx1"/>
+          </a:fontRef>
+        </p:style>
+      </p:cxnSp>
     </p:spTree>
     <p:extLst>
       <p:ext uri="{BB962C8B-B14F-4D97-AF65-F5344CB8AC3E}">
-        <p14:creationId xmlns:p14="http://schemas.microsoft.com/office/powerpoint/2010/main" xmlns="" val="567472425"/>
+        <p14:creationId xmlns:p14="http://schemas.microsoft.com/office/powerpoint/2010/main" val="567472425"/>
       </p:ext>
     </p:extLst>
   </p:cSld>

</xml_diff>